<commit_message>
fixed some tests and changed last presentation
</commit_message>
<xml_diff>
--- a/projectmanagement/presentations/3_Auto-B-Day_Endpraesentation.pptx
+++ b/projectmanagement/presentations/3_Auto-B-Day_Endpraesentation.pptx
@@ -2879,7 +2879,7 @@
           <a:p>
             <a:fld id="{E79B2E80-2F6A-4DA4-B3C0-41493247AAD8}" type="datetimeFigureOut">
               <a:rPr lang="de-DE" smtClean="0"/>
-              <a:t>27.01.2012</a:t>
+              <a:t>29.01.12</a:t>
             </a:fld>
             <a:endParaRPr lang="de-DE"/>
           </a:p>
@@ -3164,7 +3164,7 @@
           <a:p>
             <a:fld id="{E79B2E80-2F6A-4DA4-B3C0-41493247AAD8}" type="datetimeFigureOut">
               <a:rPr lang="de-DE" smtClean="0"/>
-              <a:t>27.01.2012</a:t>
+              <a:t>29.01.12</a:t>
             </a:fld>
             <a:endParaRPr lang="de-DE"/>
           </a:p>
@@ -3339,7 +3339,7 @@
           <a:p>
             <a:fld id="{E79B2E80-2F6A-4DA4-B3C0-41493247AAD8}" type="datetimeFigureOut">
               <a:rPr lang="de-DE" smtClean="0"/>
-              <a:t>27.01.2012</a:t>
+              <a:t>29.01.12</a:t>
             </a:fld>
             <a:endParaRPr lang="de-DE"/>
           </a:p>
@@ -3504,7 +3504,7 @@
           <a:p>
             <a:fld id="{E79B2E80-2F6A-4DA4-B3C0-41493247AAD8}" type="datetimeFigureOut">
               <a:rPr lang="de-DE" smtClean="0"/>
-              <a:t>27.01.2012</a:t>
+              <a:t>29.01.12</a:t>
             </a:fld>
             <a:endParaRPr lang="de-DE"/>
           </a:p>
@@ -3745,7 +3745,7 @@
           <a:p>
             <a:fld id="{E79B2E80-2F6A-4DA4-B3C0-41493247AAD8}" type="datetimeFigureOut">
               <a:rPr lang="de-DE" smtClean="0"/>
-              <a:t>27.01.2012</a:t>
+              <a:t>29.01.12</a:t>
             </a:fld>
             <a:endParaRPr lang="de-DE"/>
           </a:p>
@@ -3858,7 +3858,7 @@
           <a:p>
             <a:fld id="{E79B2E80-2F6A-4DA4-B3C0-41493247AAD8}" type="datetimeFigureOut">
               <a:rPr lang="de-DE" smtClean="0"/>
-              <a:t>27.01.2012</a:t>
+              <a:t>29.01.12</a:t>
             </a:fld>
             <a:endParaRPr lang="de-DE"/>
           </a:p>
@@ -4397,7 +4397,7 @@
           <a:p>
             <a:fld id="{E79B2E80-2F6A-4DA4-B3C0-41493247AAD8}" type="datetimeFigureOut">
               <a:rPr lang="de-DE" smtClean="0"/>
-              <a:t>27.01.2012</a:t>
+              <a:t>29.01.12</a:t>
             </a:fld>
             <a:endParaRPr lang="de-DE"/>
           </a:p>
@@ -4510,7 +4510,7 @@
           <a:p>
             <a:fld id="{E79B2E80-2F6A-4DA4-B3C0-41493247AAD8}" type="datetimeFigureOut">
               <a:rPr lang="de-DE" smtClean="0"/>
-              <a:t>27.01.2012</a:t>
+              <a:t>29.01.12</a:t>
             </a:fld>
             <a:endParaRPr lang="de-DE"/>
           </a:p>
@@ -4600,7 +4600,7 @@
           <a:p>
             <a:fld id="{E79B2E80-2F6A-4DA4-B3C0-41493247AAD8}" type="datetimeFigureOut">
               <a:rPr lang="de-DE" smtClean="0"/>
-              <a:t>27.01.2012</a:t>
+              <a:t>29.01.12</a:t>
             </a:fld>
             <a:endParaRPr lang="de-DE"/>
           </a:p>
@@ -7251,7 +7251,7 @@
           <a:p>
             <a:fld id="{E79B2E80-2F6A-4DA4-B3C0-41493247AAD8}" type="datetimeFigureOut">
               <a:rPr lang="de-DE" smtClean="0"/>
-              <a:t>27.01.2012</a:t>
+              <a:t>29.01.12</a:t>
             </a:fld>
             <a:endParaRPr lang="de-DE"/>
           </a:p>
@@ -10463,7 +10463,7 @@
           <a:p>
             <a:fld id="{E79B2E80-2F6A-4DA4-B3C0-41493247AAD8}" type="datetimeFigureOut">
               <a:rPr lang="de-DE" smtClean="0"/>
-              <a:t>27.01.2012</a:t>
+              <a:t>29.01.12</a:t>
             </a:fld>
             <a:endParaRPr lang="de-DE"/>
           </a:p>
@@ -13285,7 +13285,7 @@
           <a:p>
             <a:fld id="{E79B2E80-2F6A-4DA4-B3C0-41493247AAD8}" type="datetimeFigureOut">
               <a:rPr lang="de-DE" smtClean="0"/>
-              <a:t>27.01.2012</a:t>
+              <a:t>29.01.12</a:t>
             </a:fld>
             <a:endParaRPr lang="de-DE"/>
           </a:p>
@@ -13879,15 +13879,6 @@
               </a:rPr>
               <a:t>Final</a:t>
             </a:r>
-            <a:endParaRPr lang="de-DE" sz="5400" b="1" cap="all" dirty="0" smtClean="0">
-              <a:ln w="0"/>
-              <a:solidFill>
-                <a:srgbClr val="800000">
-                  <a:alpha val="84000"/>
-                </a:srgbClr>
-              </a:solidFill>
-              <a:effectLst/>
-            </a:endParaRPr>
           </a:p>
         </p:txBody>
       </p:sp>
@@ -13904,7 +13895,7 @@
   <p:timing>
     <p:tnLst>
       <p:par>
-        <p:cTn id="1" dur="indefinite" restart="never" nodeType="tmRoot"/>
+        <p:cTn xmlns:p14="http://schemas.microsoft.com/office/powerpoint/2010/main" id="1" dur="indefinite" restart="never" nodeType="tmRoot"/>
       </p:par>
     </p:tnLst>
   </p:timing>
@@ -13991,14 +13982,14 @@
           </a:ln>
           <a:effectLst/>
           <a:extLst>
-            <a:ext uri="{909E8E84-426E-40DD-AFC4-6F175D3DCCD1}">
+            <a:ext uri="{909E8E84-426E-40dd-AFC4-6F175D3DCCD1}">
               <a14:hiddenFill xmlns:a14="http://schemas.microsoft.com/office/drawing/2010/main">
                 <a:solidFill>
                   <a:schemeClr val="accent1"/>
                 </a:solidFill>
               </a14:hiddenFill>
             </a:ext>
-            <a:ext uri="{91240B29-F687-4F45-9708-019B960494DF}">
+            <a:ext uri="{91240B29-F687-4f45-9708-019B960494DF}">
               <a14:hiddenLine xmlns:a14="http://schemas.microsoft.com/office/drawing/2010/main" w="9525">
                 <a:solidFill>
                   <a:schemeClr val="tx1"/>
@@ -14008,7 +13999,7 @@
                 <a:tailEnd/>
               </a14:hiddenLine>
             </a:ext>
-            <a:ext uri="{AF507438-7753-43E0-B8FC-AC1667EBCBE1}">
+            <a:ext uri="{AF507438-7753-43e0-B8FC-AC1667EBCBE1}">
               <a14:hiddenEffects xmlns:a14="http://schemas.microsoft.com/office/drawing/2010/main">
                 <a:effectLst>
                   <a:outerShdw dist="35921" dir="2700000" algn="ctr" rotWithShape="0">
@@ -14033,7 +14024,7 @@
   <p:timing>
     <p:tnLst>
       <p:par>
-        <p:cTn id="1" dur="indefinite" restart="never" nodeType="tmRoot"/>
+        <p:cTn xmlns:p14="http://schemas.microsoft.com/office/powerpoint/2010/main" id="1" dur="indefinite" restart="never" nodeType="tmRoot"/>
       </p:par>
     </p:tnLst>
   </p:timing>
@@ -14120,7 +14111,7 @@
   <p:timing>
     <p:tnLst>
       <p:par>
-        <p:cTn id="1" dur="indefinite" restart="never" nodeType="tmRoot"/>
+        <p:cTn xmlns:p14="http://schemas.microsoft.com/office/powerpoint/2010/main" id="1" dur="indefinite" restart="never" nodeType="tmRoot"/>
       </p:par>
     </p:tnLst>
   </p:timing>
@@ -14218,7 +14209,7 @@
   <p:timing>
     <p:tnLst>
       <p:par>
-        <p:cTn id="1" dur="indefinite" restart="never" nodeType="tmRoot"/>
+        <p:cTn xmlns:p14="http://schemas.microsoft.com/office/powerpoint/2010/main" id="1" dur="indefinite" restart="never" nodeType="tmRoot"/>
       </p:par>
     </p:tnLst>
   </p:timing>
@@ -14368,7 +14359,7 @@
   <p:timing>
     <p:tnLst>
       <p:par>
-        <p:cTn id="1" dur="indefinite" restart="never" nodeType="tmRoot"/>
+        <p:cTn xmlns:p14="http://schemas.microsoft.com/office/powerpoint/2010/main" id="1" dur="indefinite" restart="never" nodeType="tmRoot"/>
       </p:par>
     </p:tnLst>
   </p:timing>
@@ -14545,7 +14536,7 @@
   <p:timing>
     <p:tnLst>
       <p:par>
-        <p:cTn id="1" dur="indefinite" restart="never" nodeType="tmRoot"/>
+        <p:cTn xmlns:p14="http://schemas.microsoft.com/office/powerpoint/2010/main" id="1" dur="indefinite" restart="never" nodeType="tmRoot"/>
       </p:par>
     </p:tnLst>
   </p:timing>
@@ -14631,7 +14622,7 @@
   <p:timing>
     <p:tnLst>
       <p:par>
-        <p:cTn id="1" dur="indefinite" restart="never" nodeType="tmRoot"/>
+        <p:cTn xmlns:p14="http://schemas.microsoft.com/office/powerpoint/2010/main" id="1" dur="indefinite" restart="never" nodeType="tmRoot"/>
       </p:par>
     </p:tnLst>
   </p:timing>
@@ -14735,7 +14726,7 @@
   <p:timing>
     <p:tnLst>
       <p:par>
-        <p:cTn id="1" dur="indefinite" restart="never" nodeType="tmRoot"/>
+        <p:cTn xmlns:p14="http://schemas.microsoft.com/office/powerpoint/2010/main" id="1" dur="indefinite" restart="never" nodeType="tmRoot"/>
       </p:par>
     </p:tnLst>
   </p:timing>
@@ -14858,7 +14849,6 @@
               <a:rPr lang="de-DE" dirty="0" smtClean="0"/>
               <a:t>Datenbank</a:t>
             </a:r>
-            <a:endParaRPr lang="de-DE" dirty="0" smtClean="0"/>
           </a:p>
           <a:p>
             <a:r>
@@ -14883,7 +14873,6 @@
               <a:rPr lang="de-DE" dirty="0" smtClean="0"/>
               <a:t>Kurze Vorführung</a:t>
             </a:r>
-            <a:endParaRPr lang="de-DE" dirty="0" smtClean="0"/>
           </a:p>
         </p:txBody>
       </p:sp>
@@ -14900,7 +14889,7 @@
   <p:timing>
     <p:tnLst>
       <p:par>
-        <p:cTn id="1" dur="indefinite" restart="never" nodeType="tmRoot"/>
+        <p:cTn xmlns:p14="http://schemas.microsoft.com/office/powerpoint/2010/main" id="1" dur="indefinite" restart="never" nodeType="tmRoot"/>
       </p:par>
     </p:tnLst>
   </p:timing>
@@ -15009,7 +14998,7 @@
   <p:timing>
     <p:tnLst>
       <p:par>
-        <p:cTn id="1" dur="indefinite" restart="never" nodeType="tmRoot"/>
+        <p:cTn xmlns:p14="http://schemas.microsoft.com/office/powerpoint/2010/main" id="1" dur="indefinite" restart="never" nodeType="tmRoot"/>
       </p:par>
     </p:tnLst>
   </p:timing>
@@ -15055,15 +15044,7 @@
           <a:p>
             <a:r>
               <a:rPr lang="de-DE" dirty="0" smtClean="0"/>
-              <a:t>Was </a:t>
-            </a:r>
-            <a:r>
-              <a:rPr lang="de-DE" dirty="0" smtClean="0"/>
-              <a:t>war die </a:t>
-            </a:r>
-            <a:r>
-              <a:rPr lang="de-DE" dirty="0" smtClean="0"/>
-              <a:t>Grundidee?</a:t>
+              <a:t>Was war die Grundidee?</a:t>
             </a:r>
             <a:endParaRPr lang="de-DE" dirty="0"/>
           </a:p>
@@ -15126,7 +15107,7 @@
   <p:timing>
     <p:tnLst>
       <p:par>
-        <p:cTn id="1" dur="indefinite" restart="never" nodeType="tmRoot"/>
+        <p:cTn xmlns:p14="http://schemas.microsoft.com/office/powerpoint/2010/main" id="1" dur="indefinite" restart="never" nodeType="tmRoot"/>
       </p:par>
     </p:tnLst>
   </p:timing>
@@ -15280,8 +15261,13 @@
           <a:p>
             <a:r>
               <a:rPr lang="de-DE" dirty="0" smtClean="0"/>
-              <a:t>Kontakte haben Email-Adresse</a:t>
+              <a:t>Kontakte haben Email-</a:t>
             </a:r>
+            <a:r>
+              <a:rPr lang="de-DE" dirty="0" smtClean="0"/>
+              <a:t>Adresse, Name, Vorname</a:t>
+            </a:r>
+            <a:endParaRPr lang="de-DE" dirty="0" smtClean="0"/>
           </a:p>
           <a:p>
             <a:r>
@@ -15387,7 +15373,7 @@
   <p:timing>
     <p:tnLst>
       <p:par>
-        <p:cTn id="1" dur="indefinite" restart="never" nodeType="tmRoot"/>
+        <p:cTn xmlns:p14="http://schemas.microsoft.com/office/powerpoint/2010/main" id="1" dur="indefinite" restart="never" nodeType="tmRoot"/>
       </p:par>
     </p:tnLst>
   </p:timing>
@@ -15586,14 +15572,14 @@
           </a:ln>
           <a:effectLst/>
           <a:extLst>
-            <a:ext uri="{909E8E84-426E-40DD-AFC4-6F175D3DCCD1}">
+            <a:ext uri="{909E8E84-426E-40dd-AFC4-6F175D3DCCD1}">
               <a14:hiddenFill xmlns:a14="http://schemas.microsoft.com/office/drawing/2010/main">
                 <a:solidFill>
                   <a:schemeClr val="accent1"/>
                 </a:solidFill>
               </a14:hiddenFill>
             </a:ext>
-            <a:ext uri="{91240B29-F687-4F45-9708-019B960494DF}">
+            <a:ext uri="{91240B29-F687-4f45-9708-019B960494DF}">
               <a14:hiddenLine xmlns:a14="http://schemas.microsoft.com/office/drawing/2010/main" w="9525">
                 <a:solidFill>
                   <a:schemeClr val="tx1"/>
@@ -15603,7 +15589,7 @@
                 <a:tailEnd/>
               </a14:hiddenLine>
             </a:ext>
-            <a:ext uri="{AF507438-7753-43E0-B8FC-AC1667EBCBE1}">
+            <a:ext uri="{AF507438-7753-43e0-B8FC-AC1667EBCBE1}">
               <a14:hiddenEffects xmlns:a14="http://schemas.microsoft.com/office/drawing/2010/main">
                 <a:effectLst>
                   <a:outerShdw dist="35921" dir="2700000" algn="ctr" rotWithShape="0">
@@ -15660,7 +15646,7 @@
   <p:timing>
     <p:tnLst>
       <p:par>
-        <p:cTn id="1" dur="indefinite" restart="never" nodeType="tmRoot"/>
+        <p:cTn xmlns:p14="http://schemas.microsoft.com/office/powerpoint/2010/main" id="1" dur="indefinite" restart="never" nodeType="tmRoot"/>
       </p:par>
     </p:tnLst>
   </p:timing>

</xml_diff>